<commit_message>
Update README.md, add EDA notebook and data ingestion script
</commit_message>
<xml_diff>
--- a/docs/Olist_Project_Presentation-v0.7.pptx
+++ b/docs/Olist_Project_Presentation-v0.7.pptx
@@ -165,20 +165,6 @@
 </p:cmAuthorLst>
 </file>
 
-<file path=ppt/comments/comment1.xml><?xml version="1.0" encoding="utf-8"?>
-<p:cmLst xmlns:a="http://schemas.openxmlformats.org/drawingml/2006/main" xmlns:r="http://schemas.openxmlformats.org/officeDocument/2006/relationships" xmlns:p="http://schemas.openxmlformats.org/presentationml/2006/main">
-  <p:cm authorId="1" dt="2025-09-12T02:44:55.806" idx="4">
-    <p:pos x="3188" y="1040"/>
-    <p:text>Correct?</p:text>
-    <p:extLst>
-      <p:ext uri="{C676402C-5697-4E1C-873F-D02D1690AC5C}">
-        <p15:threadingInfo xmlns:p15="http://schemas.microsoft.com/office/powerpoint/2012/main" timeZoneBias="-480"/>
-      </p:ext>
-    </p:extLst>
-  </p:cm>
-</p:cmLst>
-</file>
-
 <file path=ppt/notesMasters/notesMaster1.xml><?xml version="1.0" encoding="utf-8"?>
 <p:notesMaster xmlns:a="http://schemas.openxmlformats.org/drawingml/2006/main" xmlns:r="http://schemas.openxmlformats.org/officeDocument/2006/relationships" xmlns:p="http://schemas.openxmlformats.org/presentationml/2006/main">
   <p:cSld>
@@ -261,7 +247,7 @@
           <a:p>
             <a:fld id="{B3577A3E-42BD-4082-A712-46B183D86759}" type="datetimeFigureOut">
               <a:rPr lang="en-SG" smtClean="0"/>
-              <a:t>15/9/2025</a:t>
+              <a:t>16/9/2025</a:t>
             </a:fld>
             <a:endParaRPr lang="en-SG"/>
           </a:p>
@@ -945,7 +931,7 @@
           <a:p>
             <a:fld id="{5BCAD085-E8A6-8845-BD4E-CB4CCA059FC4}" type="datetimeFigureOut">
               <a:rPr lang="en-US" smtClean="0"/>
-              <a:t>9/15/2025</a:t>
+              <a:t>9/16/2025</a:t>
             </a:fld>
             <a:endParaRPr lang="en-US"/>
           </a:p>
@@ -1249,7 +1235,7 @@
           <a:p>
             <a:fld id="{5BCAD085-E8A6-8845-BD4E-CB4CCA059FC4}" type="datetimeFigureOut">
               <a:rPr lang="en-US" smtClean="0"/>
-              <a:t>9/15/2025</a:t>
+              <a:t>9/16/2025</a:t>
             </a:fld>
             <a:endParaRPr lang="en-US"/>
           </a:p>
@@ -1527,7 +1513,7 @@
           <a:p>
             <a:fld id="{5BCAD085-E8A6-8845-BD4E-CB4CCA059FC4}" type="datetimeFigureOut">
               <a:rPr lang="en-US" smtClean="0"/>
-              <a:t>9/15/2025</a:t>
+              <a:t>9/16/2025</a:t>
             </a:fld>
             <a:endParaRPr lang="en-US"/>
           </a:p>
@@ -2097,7 +2083,7 @@
           <a:p>
             <a:fld id="{5BCAD085-E8A6-8845-BD4E-CB4CCA059FC4}" type="datetimeFigureOut">
               <a:rPr lang="en-US" smtClean="0"/>
-              <a:t>9/15/2025</a:t>
+              <a:t>9/16/2025</a:t>
             </a:fld>
             <a:endParaRPr lang="en-US"/>
           </a:p>
@@ -2375,7 +2361,7 @@
           <a:p>
             <a:fld id="{5BCAD085-E8A6-8845-BD4E-CB4CCA059FC4}" type="datetimeFigureOut">
               <a:rPr lang="en-US" smtClean="0"/>
-              <a:t>9/15/2025</a:t>
+              <a:t>9/16/2025</a:t>
             </a:fld>
             <a:endParaRPr lang="en-US"/>
           </a:p>
@@ -2937,7 +2923,7 @@
           <a:p>
             <a:fld id="{5BCAD085-E8A6-8845-BD4E-CB4CCA059FC4}" type="datetimeFigureOut">
               <a:rPr lang="en-US" smtClean="0"/>
-              <a:t>9/15/2025</a:t>
+              <a:t>9/16/2025</a:t>
             </a:fld>
             <a:endParaRPr lang="en-US"/>
           </a:p>
@@ -3264,7 +3250,7 @@
           <a:p>
             <a:fld id="{5BCAD085-E8A6-8845-BD4E-CB4CCA059FC4}" type="datetimeFigureOut">
               <a:rPr lang="en-US" smtClean="0"/>
-              <a:t>9/15/2025</a:t>
+              <a:t>9/16/2025</a:t>
             </a:fld>
             <a:endParaRPr lang="en-US"/>
           </a:p>
@@ -3475,7 +3461,7 @@
           <a:p>
             <a:fld id="{5BCAD085-E8A6-8845-BD4E-CB4CCA059FC4}" type="datetimeFigureOut">
               <a:rPr lang="en-US" smtClean="0"/>
-              <a:t>9/15/2025</a:t>
+              <a:t>9/16/2025</a:t>
             </a:fld>
             <a:endParaRPr lang="en-US"/>
           </a:p>
@@ -3691,7 +3677,7 @@
           <a:p>
             <a:fld id="{5BCAD085-E8A6-8845-BD4E-CB4CCA059FC4}" type="datetimeFigureOut">
               <a:rPr lang="en-US" smtClean="0"/>
-              <a:t>9/15/2025</a:t>
+              <a:t>9/16/2025</a:t>
             </a:fld>
             <a:endParaRPr lang="en-US"/>
           </a:p>
@@ -3897,7 +3883,7 @@
           <a:p>
             <a:fld id="{5BCAD085-E8A6-8845-BD4E-CB4CCA059FC4}" type="datetimeFigureOut">
               <a:rPr lang="en-US" smtClean="0"/>
-              <a:t>9/15/2025</a:t>
+              <a:t>9/16/2025</a:t>
             </a:fld>
             <a:endParaRPr lang="en-US"/>
           </a:p>
@@ -4175,7 +4161,7 @@
           <a:p>
             <a:fld id="{5BCAD085-E8A6-8845-BD4E-CB4CCA059FC4}" type="datetimeFigureOut">
               <a:rPr lang="en-US" smtClean="0"/>
-              <a:t>9/15/2025</a:t>
+              <a:t>9/16/2025</a:t>
             </a:fld>
             <a:endParaRPr lang="en-US"/>
           </a:p>
@@ -4441,7 +4427,7 @@
           <a:p>
             <a:fld id="{5BCAD085-E8A6-8845-BD4E-CB4CCA059FC4}" type="datetimeFigureOut">
               <a:rPr lang="en-US" smtClean="0"/>
-              <a:t>9/15/2025</a:t>
+              <a:t>9/16/2025</a:t>
             </a:fld>
             <a:endParaRPr lang="en-US"/>
           </a:p>
@@ -4847,7 +4833,7 @@
           <a:p>
             <a:fld id="{5BCAD085-E8A6-8845-BD4E-CB4CCA059FC4}" type="datetimeFigureOut">
               <a:rPr lang="en-US" smtClean="0"/>
-              <a:t>9/15/2025</a:t>
+              <a:t>9/16/2025</a:t>
             </a:fld>
             <a:endParaRPr lang="en-US"/>
           </a:p>
@@ -5006,7 +4992,7 @@
           <a:p>
             <a:fld id="{5BCAD085-E8A6-8845-BD4E-CB4CCA059FC4}" type="datetimeFigureOut">
               <a:rPr lang="en-US" smtClean="0"/>
-              <a:t>9/15/2025</a:t>
+              <a:t>9/16/2025</a:t>
             </a:fld>
             <a:endParaRPr lang="en-US"/>
           </a:p>
@@ -5131,7 +5117,7 @@
           <a:p>
             <a:fld id="{5BCAD085-E8A6-8845-BD4E-CB4CCA059FC4}" type="datetimeFigureOut">
               <a:rPr lang="en-US" smtClean="0"/>
-              <a:t>9/15/2025</a:t>
+              <a:t>9/16/2025</a:t>
             </a:fld>
             <a:endParaRPr lang="en-US"/>
           </a:p>
@@ -5416,7 +5402,7 @@
           <a:p>
             <a:fld id="{5BCAD085-E8A6-8845-BD4E-CB4CCA059FC4}" type="datetimeFigureOut">
               <a:rPr lang="en-US" smtClean="0"/>
-              <a:t>9/15/2025</a:t>
+              <a:t>9/16/2025</a:t>
             </a:fld>
             <a:endParaRPr lang="en-US"/>
           </a:p>
@@ -5710,7 +5696,7 @@
           <a:p>
             <a:fld id="{5BCAD085-E8A6-8845-BD4E-CB4CCA059FC4}" type="datetimeFigureOut">
               <a:rPr lang="en-US" smtClean="0"/>
-              <a:t>9/15/2025</a:t>
+              <a:t>9/16/2025</a:t>
             </a:fld>
             <a:endParaRPr lang="en-US"/>
           </a:p>
@@ -5924,7 +5910,7 @@
           <a:p>
             <a:fld id="{5BCAD085-E8A6-8845-BD4E-CB4CCA059FC4}" type="datetimeFigureOut">
               <a:rPr lang="en-US" smtClean="0"/>
-              <a:t>9/15/2025</a:t>
+              <a:t>9/16/2025</a:t>
             </a:fld>
             <a:endParaRPr lang="en-US"/>
           </a:p>
@@ -17763,15 +17749,7 @@
           <a:p>
             <a:r>
               <a:rPr lang="en-US" dirty="0"/>
-              <a:t>Post Ingestion/Transformation validation: </a:t>
-            </a:r>
-            <a:r>
-              <a:rPr lang="en-US" dirty="0">
-                <a:highlight>
-                  <a:srgbClr val="09A6F5"/>
-                </a:highlight>
-              </a:rPr>
-              <a:t>DBT Expectations</a:t>
+              <a:t>Post Ingestion/Transformation validation: DBT Expectations</a:t>
             </a:r>
           </a:p>
           <a:p>

</xml_diff>